<commit_message>
Add new welcome page and changes in progress
</commit_message>
<xml_diff>
--- a/Progress3-Contributions.pptx
+++ b/Progress3-Contributions.pptx
@@ -9426,7 +9426,12 @@
             <p:ph idx="1"/>
           </p:nvPr>
         </p:nvSpPr>
-        <p:spPr/>
+        <p:spPr>
+          <a:xfrm>
+            <a:off x="2538006" y="1848307"/>
+            <a:ext cx="8915400" cy="3777622"/>
+          </a:xfrm>
+        </p:spPr>
         <p:txBody>
           <a:bodyPr>
             <a:normAutofit fontScale="92500"/>
@@ -9447,25 +9452,21 @@
                 <a:ea typeface="Calibri" panose="020F0502020204030204" pitchFamily="34" charset="0"/>
                 <a:cs typeface="Calibri" panose="020F0502020204030204" pitchFamily="34" charset="0"/>
               </a:rPr>
-              <a:t>: Developed a line chart of the distribution of Rose Crested Blue Pipits over the years using D3.(</a:t>
-            </a:r>
-            <a:r>
-              <a:rPr lang="en-US" dirty="0">
-                <a:latin typeface="Calibri" panose="020F0502020204030204" pitchFamily="34" charset="0"/>
-                <a:ea typeface="Calibri" panose="020F0502020204030204" pitchFamily="34" charset="0"/>
-                <a:cs typeface="Calibri" panose="020F0502020204030204" pitchFamily="34" charset="0"/>
-                <a:hlinkClick r:id="rId2"/>
-              </a:rPr>
-              <a:t>Link</a:t>
-            </a:r>
-            <a:r>
-              <a:rPr lang="en-US" dirty="0">
+              <a:t>: Developed a line chart of the distribution of Rose Crested Blue Pipits over the years using D3.(Slide </a:t>
+            </a:r>
+            <a:r>
+              <a:rPr lang="en-US">
                 <a:latin typeface="Calibri" panose="020F0502020204030204" pitchFamily="34" charset="0"/>
                 <a:ea typeface="Calibri" panose="020F0502020204030204" pitchFamily="34" charset="0"/>
                 <a:cs typeface="Calibri" panose="020F0502020204030204" pitchFamily="34" charset="0"/>
               </a:rPr>
-              <a:t>)</a:t>
-            </a:r>
+              <a:t>:- 4)</a:t>
+            </a:r>
+            <a:endParaRPr lang="en-US" dirty="0">
+              <a:latin typeface="Calibri" panose="020F0502020204030204" pitchFamily="34" charset="0"/>
+              <a:ea typeface="Calibri" panose="020F0502020204030204" pitchFamily="34" charset="0"/>
+              <a:cs typeface="Calibri" panose="020F0502020204030204" pitchFamily="34" charset="0"/>
+            </a:endParaRPr>
           </a:p>
           <a:p>
             <a:r>
@@ -9482,24 +9483,7 @@
                 <a:ea typeface="Calibri" panose="020F0502020204030204" pitchFamily="34" charset="0"/>
                 <a:cs typeface="Calibri" panose="020F0502020204030204" pitchFamily="34" charset="0"/>
               </a:rPr>
-              <a:t>Developed Bar Graph of the birds overs the years and total birds by quality using D3. (</a:t>
-            </a:r>
-            <a:r>
-              <a:rPr lang="en-US" dirty="0">
-                <a:latin typeface="Calibri" panose="020F0502020204030204" pitchFamily="34" charset="0"/>
-                <a:ea typeface="Calibri" panose="020F0502020204030204" pitchFamily="34" charset="0"/>
-                <a:cs typeface="Calibri" panose="020F0502020204030204" pitchFamily="34" charset="0"/>
-                <a:hlinkClick r:id="rId3"/>
-              </a:rPr>
-              <a:t>Link</a:t>
-            </a:r>
-            <a:r>
-              <a:rPr lang="en-US" dirty="0">
-                <a:latin typeface="Calibri" panose="020F0502020204030204" pitchFamily="34" charset="0"/>
-                <a:ea typeface="Calibri" panose="020F0502020204030204" pitchFamily="34" charset="0"/>
-                <a:cs typeface="Calibri" panose="020F0502020204030204" pitchFamily="34" charset="0"/>
-              </a:rPr>
-              <a:t>)</a:t>
+              <a:t>Developed Bar Graph of the birds overs the years and total birds by quality using D3.(Slide :- 5, 3)</a:t>
             </a:r>
           </a:p>
           <a:p>
@@ -9549,24 +9533,7 @@
                 <a:ea typeface="Calibri" panose="020F0502020204030204" pitchFamily="34" charset="0"/>
                 <a:cs typeface="Calibri" panose="020F0502020204030204" pitchFamily="34" charset="0"/>
               </a:rPr>
-              <a:t> according the number of birds. (</a:t>
-            </a:r>
-            <a:r>
-              <a:rPr lang="en-US" dirty="0">
-                <a:latin typeface="Calibri" panose="020F0502020204030204" pitchFamily="34" charset="0"/>
-                <a:ea typeface="Calibri" panose="020F0502020204030204" pitchFamily="34" charset="0"/>
-                <a:cs typeface="Calibri" panose="020F0502020204030204" pitchFamily="34" charset="0"/>
-                <a:hlinkClick r:id="rId4"/>
-              </a:rPr>
-              <a:t>Link</a:t>
-            </a:r>
-            <a:r>
-              <a:rPr lang="en-US" dirty="0">
-                <a:latin typeface="Calibri" panose="020F0502020204030204" pitchFamily="34" charset="0"/>
-                <a:ea typeface="Calibri" panose="020F0502020204030204" pitchFamily="34" charset="0"/>
-                <a:cs typeface="Calibri" panose="020F0502020204030204" pitchFamily="34" charset="0"/>
-              </a:rPr>
-              <a:t>)</a:t>
+              <a:t> according the number of birds.</a:t>
             </a:r>
           </a:p>
           <a:p>
@@ -9592,24 +9559,7 @@
                 <a:ea typeface="Calibri" panose="020F0502020204030204" pitchFamily="34" charset="0"/>
                 <a:cs typeface="Calibri" panose="020F0502020204030204" pitchFamily="34" charset="0"/>
               </a:rPr>
-              <a:t>The bar graph compares the levels of vocalization and quality in the provided dataset. It provides a visual representation of the frequency of different vocalization and quality categories. The pie graph refers to the presence or absence of vocalizations, while quality refers to the perceived quality of those vocalizations (</a:t>
-            </a:r>
-            <a:r>
-              <a:rPr lang="en-US" sz="1800" dirty="0">
-                <a:latin typeface="Calibri" panose="020F0502020204030204" pitchFamily="34" charset="0"/>
-                <a:ea typeface="Calibri" panose="020F0502020204030204" pitchFamily="34" charset="0"/>
-                <a:cs typeface="Calibri" panose="020F0502020204030204" pitchFamily="34" charset="0"/>
-                <a:hlinkClick r:id="rId5"/>
-              </a:rPr>
-              <a:t>Link</a:t>
-            </a:r>
-            <a:r>
-              <a:rPr lang="en-US" sz="1800" dirty="0">
-                <a:latin typeface="Calibri" panose="020F0502020204030204" pitchFamily="34" charset="0"/>
-                <a:ea typeface="Calibri" panose="020F0502020204030204" pitchFamily="34" charset="0"/>
-                <a:cs typeface="Calibri" panose="020F0502020204030204" pitchFamily="34" charset="0"/>
-              </a:rPr>
-              <a:t>)</a:t>
+              <a:t>The bar graph compares the levels of vocalization and quality in the provided dataset. It provides a visual representation of the frequency of different vocalization and quality categories. The pie graph refers to the presence or absence of vocalizations, while quality refers to the perceived quality of those vocalizations.</a:t>
             </a:r>
             <a:endParaRPr lang="en-US" sz="1800" b="1" dirty="0">
               <a:latin typeface="Calibri" panose="020F0502020204030204" pitchFamily="34" charset="0"/>
@@ -9664,24 +9614,7 @@
                 <a:ea typeface="Calibri" panose="020F0502020204030204" pitchFamily="34" charset="0"/>
                 <a:cs typeface="Calibri" panose="020F0502020204030204" pitchFamily="34" charset="0"/>
               </a:rPr>
-              <a:t>r the years. Also implemented map chart using x and y coordinate(</a:t>
-            </a:r>
-            <a:r>
-              <a:rPr lang="en-US" dirty="0">
-                <a:latin typeface="Calibri" panose="020F0502020204030204" pitchFamily="34" charset="0"/>
-                <a:ea typeface="Calibri" panose="020F0502020204030204" pitchFamily="34" charset="0"/>
-                <a:cs typeface="Calibri" panose="020F0502020204030204" pitchFamily="34" charset="0"/>
-                <a:hlinkClick r:id="rId6"/>
-              </a:rPr>
-              <a:t>Link</a:t>
-            </a:r>
-            <a:r>
-              <a:rPr lang="en-US" dirty="0">
-                <a:latin typeface="Calibri" panose="020F0502020204030204" pitchFamily="34" charset="0"/>
-                <a:ea typeface="Calibri" panose="020F0502020204030204" pitchFamily="34" charset="0"/>
-                <a:cs typeface="Calibri" panose="020F0502020204030204" pitchFamily="34" charset="0"/>
-              </a:rPr>
-              <a:t>)</a:t>
+              <a:t>r the years. Also implemented map chart using x and y coordinate.</a:t>
             </a:r>
           </a:p>
           <a:p>
@@ -11322,6 +11255,15 @@
 </file>
 
 <file path=customXml/item2.xml><?xml version="1.0" encoding="utf-8"?>
+<?mso-contentType ?>
+<FormTemplates xmlns="http://schemas.microsoft.com/sharepoint/v3/contenttype/forms">
+  <Display>DocumentLibraryForm</Display>
+  <Edit>DocumentLibraryForm</Edit>
+  <New>DocumentLibraryForm</New>
+</FormTemplates>
+</file>
+
+<file path=customXml/item3.xml><?xml version="1.0" encoding="utf-8"?>
 <ct:contentTypeSchema xmlns:ct="http://schemas.microsoft.com/office/2006/metadata/contentType" xmlns:ma="http://schemas.microsoft.com/office/2006/metadata/properties/metaAttributes" ct:_="" ma:_="" ma:contentTypeName="Document" ma:contentTypeID="0x0101006F4CD756468722469D212D0AF49699D6" ma:contentTypeVersion="4" ma:contentTypeDescription="Create a new document." ma:contentTypeScope="" ma:versionID="f29cc9f28e00c861a88428ca95e2f1e6">
   <xsd:schema xmlns:xsd="http://www.w3.org/2001/XMLSchema" xmlns:xs="http://www.w3.org/2001/XMLSchema" xmlns:p="http://schemas.microsoft.com/office/2006/metadata/properties" xmlns:ns3="088e6f74-2d7b-481a-92df-31f4d786b379" targetNamespace="http://schemas.microsoft.com/office/2006/metadata/properties" ma:root="true" ma:fieldsID="c5ed655a32b7c999a75c5b7cc0acc986" ns3:_="">
     <xsd:import namespace="088e6f74-2d7b-481a-92df-31f4d786b379"/>
@@ -11465,15 +11407,6 @@
 </ct:contentTypeSchema>
 </file>
 
-<file path=customXml/item3.xml><?xml version="1.0" encoding="utf-8"?>
-<?mso-contentType ?>
-<FormTemplates xmlns="http://schemas.microsoft.com/sharepoint/v3/contenttype/forms">
-  <Display>DocumentLibraryForm</Display>
-  <Edit>DocumentLibraryForm</Edit>
-  <New>DocumentLibraryForm</New>
-</FormTemplates>
-</file>
-
 <file path=customXml/itemProps1.xml><?xml version="1.0" encoding="utf-8"?>
 <ds:datastoreItem xmlns:ds="http://schemas.openxmlformats.org/officeDocument/2006/customXml" ds:itemID="{5930DFE0-9B4C-4970-A520-E98BE96530ED}">
   <ds:schemaRefs>
@@ -11491,6 +11424,14 @@
 </file>
 
 <file path=customXml/itemProps2.xml><?xml version="1.0" encoding="utf-8"?>
+<ds:datastoreItem xmlns:ds="http://schemas.openxmlformats.org/officeDocument/2006/customXml" ds:itemID="{0ADEE09E-FAF2-45CA-BCA6-3F1EA4B93C63}">
+  <ds:schemaRefs>
+    <ds:schemaRef ds:uri="http://schemas.microsoft.com/sharepoint/v3/contenttype/forms"/>
+  </ds:schemaRefs>
+</ds:datastoreItem>
+</file>
+
+<file path=customXml/itemProps3.xml><?xml version="1.0" encoding="utf-8"?>
 <ds:datastoreItem xmlns:ds="http://schemas.openxmlformats.org/officeDocument/2006/customXml" ds:itemID="{C9013C49-50E0-4174-91A3-156887AA3F81}">
   <ds:schemaRefs>
     <ds:schemaRef ds:uri="http://schemas.microsoft.com/office/2006/metadata/contentType"/>
@@ -11506,12 +11447,4 @@
     <ds:schemaRef ds:uri="http://schemas.microsoft.com/internal/obd"/>
   </ds:schemaRefs>
 </ds:datastoreItem>
-</file>
-
-<file path=customXml/itemProps3.xml><?xml version="1.0" encoding="utf-8"?>
-<ds:datastoreItem xmlns:ds="http://schemas.openxmlformats.org/officeDocument/2006/customXml" ds:itemID="{0ADEE09E-FAF2-45CA-BCA6-3F1EA4B93C63}">
-  <ds:schemaRefs>
-    <ds:schemaRef ds:uri="http://schemas.microsoft.com/sharepoint/v3/contenttype/forms"/>
-  </ds:schemaRefs>
-</ds:datastoreItem>
 </file>
</xml_diff>